<commit_message>
slide formats and updates
</commit_message>
<xml_diff>
--- a/POI Training_Name/1-Lessons/2-Lesson Audio Visual Content/POI_Slide-Template.pptx
+++ b/POI Training_Name/1-Lessons/2-Lesson Audio Visual Content/POI_Slide-Template.pptx
@@ -6,12 +6,13 @@
     <p:sldMasterId id="2147483675" r:id="rId2"/>
   </p:sldMasterIdLst>
   <p:notesMasterIdLst>
-    <p:notesMasterId r:id="rId6"/>
+    <p:notesMasterId r:id="rId7"/>
   </p:notesMasterIdLst>
   <p:sldIdLst>
-    <p:sldId id="380" r:id="rId3"/>
+    <p:sldId id="381" r:id="rId3"/>
     <p:sldId id="257" r:id="rId4"/>
-    <p:sldId id="377" r:id="rId5"/>
+    <p:sldId id="382" r:id="rId5"/>
+    <p:sldId id="377" r:id="rId6"/>
   </p:sldIdLst>
   <p:sldSz cx="12192000" cy="6858000"/>
   <p:notesSz cx="6858000" cy="9144000"/>
@@ -115,6 +116,11 @@
       </a:defRPr>
     </a:lvl9pPr>
   </p:defaultTextStyle>
+  <p:extLst>
+    <p:ext uri="{EFAFB233-063F-42B5-8137-9DF3F51BA10A}">
+      <p15:sldGuideLst xmlns:p15="http://schemas.microsoft.com/office/powerpoint/2012/main"/>
+    </p:ext>
+  </p:extLst>
 </p:presentation>
 </file>
 
@@ -1437,8 +1443,8 @@
         </p:nvSpPr>
         <p:spPr>
           <a:xfrm>
-            <a:off x="3282385" y="2963230"/>
-            <a:ext cx="8218080" cy="1396800"/>
+            <a:off x="3296672" y="2950685"/>
+            <a:ext cx="8533378" cy="2704116"/>
           </a:xfrm>
           <a:prstGeom prst="rect">
             <a:avLst/>
@@ -1452,10 +1458,18 @@
           </a:ln>
         </p:spPr>
         <p:txBody>
-          <a:bodyPr lIns="90000" tIns="45000" rIns="90000" bIns="45000" anchor="ctr">
-            <a:noAutofit/>
+          <a:bodyPr wrap="square" lIns="90000" tIns="182880" rIns="90000" bIns="45000" anchor="t" anchorCtr="0">
+            <a:spAutoFit/>
           </a:bodyPr>
-          <a:lstStyle/>
+          <a:lstStyle>
+            <a:lvl1pPr algn="ctr">
+              <a:defRPr sz="6000">
+                <a:solidFill>
+                  <a:sysClr val="windowText" lastClr="000000"/>
+                </a:solidFill>
+              </a:defRPr>
+            </a:lvl1pPr>
+          </a:lstStyle>
           <a:p>
             <a:pPr indent="0" algn="ctr">
               <a:lnSpc>
@@ -1516,96 +1530,6 @@
               <a:latin typeface="Arial"/>
             </a:endParaRPr>
           </a:p>
-          <a:p>
-            <a:pPr marL="914400" indent="0" algn="ctr">
-              <a:lnSpc>
-                <a:spcPct val="90000"/>
-              </a:lnSpc>
-              <a:spcBef>
-                <a:spcPts val="499"/>
-              </a:spcBef>
-              <a:buNone/>
-              <a:tabLst>
-                <a:tab pos="0" algn="l"/>
-              </a:tabLst>
-            </a:pPr>
-            <a:r>
-              <a:rPr lang="en-US" sz="4800" b="1" strike="noStrike" spc="-1" dirty="0">
-                <a:solidFill>
-                  <a:srgbClr val="000000"/>
-                </a:solidFill>
-                <a:latin typeface="Arial"/>
-                <a:ea typeface="DejaVu Sans"/>
-              </a:rPr>
-              <a:t>Third level</a:t>
-            </a:r>
-            <a:endParaRPr lang="en-US" sz="4800" b="0" strike="noStrike" spc="-1" dirty="0">
-              <a:solidFill>
-                <a:srgbClr val="000000"/>
-              </a:solidFill>
-              <a:latin typeface="Arial"/>
-            </a:endParaRPr>
-          </a:p>
-          <a:p>
-            <a:pPr marL="1371600" indent="0" algn="ctr">
-              <a:lnSpc>
-                <a:spcPct val="90000"/>
-              </a:lnSpc>
-              <a:spcBef>
-                <a:spcPts val="499"/>
-              </a:spcBef>
-              <a:buNone/>
-              <a:tabLst>
-                <a:tab pos="0" algn="l"/>
-              </a:tabLst>
-            </a:pPr>
-            <a:r>
-              <a:rPr lang="en-US" sz="4400" b="1" strike="noStrike" spc="-1" dirty="0">
-                <a:solidFill>
-                  <a:srgbClr val="000000"/>
-                </a:solidFill>
-                <a:latin typeface="Arial"/>
-                <a:ea typeface="DejaVu Sans"/>
-              </a:rPr>
-              <a:t>Fourth level</a:t>
-            </a:r>
-            <a:endParaRPr lang="en-US" sz="4400" b="0" strike="noStrike" spc="-1" dirty="0">
-              <a:solidFill>
-                <a:srgbClr val="000000"/>
-              </a:solidFill>
-              <a:latin typeface="Arial"/>
-            </a:endParaRPr>
-          </a:p>
-          <a:p>
-            <a:pPr marL="1828800" indent="0" algn="ctr">
-              <a:lnSpc>
-                <a:spcPct val="90000"/>
-              </a:lnSpc>
-              <a:spcBef>
-                <a:spcPts val="499"/>
-              </a:spcBef>
-              <a:buNone/>
-              <a:tabLst>
-                <a:tab pos="0" algn="l"/>
-              </a:tabLst>
-            </a:pPr>
-            <a:r>
-              <a:rPr lang="en-US" sz="4400" b="1" strike="noStrike" spc="-1" dirty="0">
-                <a:solidFill>
-                  <a:srgbClr val="000000"/>
-                </a:solidFill>
-                <a:latin typeface="Arial"/>
-                <a:ea typeface="DejaVu Sans"/>
-              </a:rPr>
-              <a:t>Fifth level</a:t>
-            </a:r>
-            <a:endParaRPr lang="en-US" sz="4400" b="0" strike="noStrike" spc="-1" dirty="0">
-              <a:solidFill>
-                <a:srgbClr val="000000"/>
-              </a:solidFill>
-              <a:latin typeface="Arial"/>
-            </a:endParaRPr>
-          </a:p>
         </p:txBody>
       </p:sp>
       <p:sp>
@@ -1626,7 +1550,7 @@
         </p:nvSpPr>
         <p:spPr>
           <a:xfrm>
-            <a:off x="2694545" y="6084644"/>
+            <a:off x="2694545" y="103680"/>
             <a:ext cx="6802909" cy="585097"/>
           </a:xfrm>
           <a:prstGeom prst="rect">
@@ -1679,34 +1603,6 @@
               <a:t>Click to edit Master text styles</a:t>
             </a:r>
           </a:p>
-          <a:p>
-            <a:pPr lvl="1"/>
-            <a:r>
-              <a:rPr lang="en-US" dirty="0"/>
-              <a:t>Second level</a:t>
-            </a:r>
-          </a:p>
-          <a:p>
-            <a:pPr lvl="2"/>
-            <a:r>
-              <a:rPr lang="en-US" dirty="0"/>
-              <a:t>Third level</a:t>
-            </a:r>
-          </a:p>
-          <a:p>
-            <a:pPr lvl="3"/>
-            <a:r>
-              <a:rPr lang="en-US" dirty="0"/>
-              <a:t>Fourth level</a:t>
-            </a:r>
-          </a:p>
-          <a:p>
-            <a:pPr lvl="4"/>
-            <a:r>
-              <a:rPr lang="en-US" dirty="0"/>
-              <a:t>Fifth level</a:t>
-            </a:r>
-          </a:p>
         </p:txBody>
       </p:sp>
     </p:spTree>
@@ -1719,6 +1615,22 @@
   <p:clrMapOvr>
     <a:masterClrMapping/>
   </p:clrMapOvr>
+  <p:extLst>
+    <p:ext uri="{DCECCB84-F9BA-43D5-87BE-67443E8EF086}">
+      <p15:sldGuideLst xmlns:p15="http://schemas.microsoft.com/office/powerpoint/2012/main">
+        <p15:guide id="1" orient="horz" pos="2160" userDrawn="1">
+          <p15:clr>
+            <a:srgbClr val="FBAE40"/>
+          </p15:clr>
+        </p15:guide>
+        <p15:guide id="2" pos="3840" userDrawn="1">
+          <p15:clr>
+            <a:srgbClr val="FBAE40"/>
+          </p15:clr>
+        </p15:guide>
+      </p15:sldGuideLst>
+    </p:ext>
+  </p:extLst>
 </p:sldLayout>
 </file>
 
@@ -4157,10 +4069,10 @@
       </p:grpSpPr>
       <p:sp>
         <p:nvSpPr>
-          <p:cNvPr id="2" name=" 1">
+          <p:cNvPr id="2" name="Content Placeholder 1">
             <a:extLst>
               <a:ext uri="{FF2B5EF4-FFF2-40B4-BE49-F238E27FC236}">
-                <a16:creationId xmlns:a16="http://schemas.microsoft.com/office/drawing/2014/main" id="{EAD72F01-7116-818F-F5CA-6213F72D4B5D}"/>
+                <a16:creationId xmlns:a16="http://schemas.microsoft.com/office/drawing/2014/main" id="{6424299D-535A-EE7B-7BBB-37752CDCE2B3}"/>
               </a:ext>
             </a:extLst>
           </p:cNvPr>
@@ -4171,14 +4083,47 @@
             <p:ph/>
           </p:nvPr>
         </p:nvSpPr>
-        <p:spPr/>
+        <p:spPr>
+          <a:xfrm>
+            <a:off x="3296672" y="2950685"/>
+            <a:ext cx="8533378" cy="2020339"/>
+          </a:xfrm>
+        </p:spPr>
+        <p:txBody>
+          <a:bodyPr/>
+          <a:lstStyle/>
+          <a:p>
+            <a:pPr marL="0" indent="0" algn="ctr">
+              <a:buNone/>
+            </a:pPr>
+            <a:r>
+              <a:rPr lang="en-US" sz="6000" dirty="0">
+                <a:latin typeface="Arial" panose="020B0604020202020204" pitchFamily="34" charset="0"/>
+                <a:cs typeface="Arial" panose="020B0604020202020204" pitchFamily="34" charset="0"/>
+              </a:rPr>
+              <a:t>{UNIT}</a:t>
+            </a:r>
+          </a:p>
+          <a:p>
+            <a:pPr marL="0" indent="0" algn="ctr">
+              <a:buNone/>
+            </a:pPr>
+            <a:r>
+              <a:rPr lang="en-US" sz="6000" dirty="0">
+                <a:latin typeface="Arial" panose="020B0604020202020204" pitchFamily="34" charset="0"/>
+                <a:cs typeface="Arial" panose="020B0604020202020204" pitchFamily="34" charset="0"/>
+              </a:rPr>
+              <a:t>{COURSE}</a:t>
+            </a:r>
+          </a:p>
+        </p:txBody>
       </p:sp>
       <p:sp>
         <p:nvSpPr>
           <p:cNvPr id="3" name="Text Placeholder 2">
             <a:extLst>
               <a:ext uri="{FF2B5EF4-FFF2-40B4-BE49-F238E27FC236}">
-                <a16:creationId xmlns:a16="http://schemas.microsoft.com/office/drawing/2014/main" id="{2B50A6E1-2E26-A929-9150-AF7A9E25AA05}"/>
+                <a16:creationId xmlns:a16="http://schemas.microsoft.com/office/drawing/2014/main" id="{4B24374E-4CC2-709F-BC3B-354075F6FB78}"/>
               </a:ext>
             </a:extLst>
           </p:cNvPr>
@@ -4194,17 +4139,14 @@
           <a:bodyPr/>
           <a:lstStyle/>
           <a:p>
-            <a:r>
-              <a:rPr lang="en-US" dirty="0"/>
-              <a:t>Overall Classification: Unclassified</a:t>
-            </a:r>
+            <a:endParaRPr lang="en-US"/>
           </a:p>
         </p:txBody>
       </p:sp>
     </p:spTree>
     <p:extLst>
       <p:ext uri="{BB962C8B-B14F-4D97-AF65-F5344CB8AC3E}">
-        <p14:creationId xmlns:p14="http://schemas.microsoft.com/office/powerpoint/2010/main" val="982622322"/>
+        <p14:creationId xmlns:p14="http://schemas.microsoft.com/office/powerpoint/2010/main" val="1013508056"/>
       </p:ext>
     </p:extLst>
   </p:cSld>
@@ -4233,10 +4175,10 @@
       </p:grpSpPr>
       <p:sp>
         <p:nvSpPr>
-          <p:cNvPr id="4" name="Content Placeholder 3">
+          <p:cNvPr id="2" name="Content Placeholder 1">
             <a:extLst>
               <a:ext uri="{FF2B5EF4-FFF2-40B4-BE49-F238E27FC236}">
-                <a16:creationId xmlns:a16="http://schemas.microsoft.com/office/drawing/2014/main" id="{0762D0BC-E9D6-2681-E127-3D030425EDEC}"/>
+                <a16:creationId xmlns:a16="http://schemas.microsoft.com/office/drawing/2014/main" id="{9A99D188-A824-2E37-54D1-4E7C1EB15155}"/>
               </a:ext>
             </a:extLst>
           </p:cNvPr>
@@ -4252,16 +4194,16 @@
           <a:bodyPr/>
           <a:lstStyle/>
           <a:p>
-            <a:endParaRPr lang="en-US" dirty="0"/>
-          </a:p>
-        </p:txBody>
-      </p:sp>
-      <p:sp>
-        <p:nvSpPr>
-          <p:cNvPr id="5" name="Title 4">
+            <a:endParaRPr lang="en-US"/>
+          </a:p>
+        </p:txBody>
+      </p:sp>
+      <p:sp>
+        <p:nvSpPr>
+          <p:cNvPr id="3" name="Title 2">
             <a:extLst>
               <a:ext uri="{FF2B5EF4-FFF2-40B4-BE49-F238E27FC236}">
-                <a16:creationId xmlns:a16="http://schemas.microsoft.com/office/drawing/2014/main" id="{B25AB17B-468C-8CC4-D579-CB3BB72A9D23}"/>
+                <a16:creationId xmlns:a16="http://schemas.microsoft.com/office/drawing/2014/main" id="{EECFB502-B790-EC2F-D54B-7F2FA250F14A}"/>
               </a:ext>
             </a:extLst>
           </p:cNvPr>
@@ -4295,6 +4237,86 @@
 </file>
 
 <file path=ppt/slides/slide3.xml><?xml version="1.0" encoding="utf-8"?>
+<p:sld xmlns:a="http://schemas.openxmlformats.org/drawingml/2006/main" xmlns:r="http://schemas.openxmlformats.org/officeDocument/2006/relationships" xmlns:p="http://schemas.openxmlformats.org/presentationml/2006/main">
+  <p:cSld>
+    <p:spTree>
+      <p:nvGrpSpPr>
+        <p:cNvPr id="1" name=""/>
+        <p:cNvGrpSpPr/>
+        <p:nvPr/>
+      </p:nvGrpSpPr>
+      <p:grpSpPr>
+        <a:xfrm>
+          <a:off x="0" y="0"/>
+          <a:ext cx="0" cy="0"/>
+          <a:chOff x="0" y="0"/>
+          <a:chExt cx="0" cy="0"/>
+        </a:xfrm>
+      </p:grpSpPr>
+      <p:sp>
+        <p:nvSpPr>
+          <p:cNvPr id="2" name="Content Placeholder 1">
+            <a:extLst>
+              <a:ext uri="{FF2B5EF4-FFF2-40B4-BE49-F238E27FC236}">
+                <a16:creationId xmlns:a16="http://schemas.microsoft.com/office/drawing/2014/main" id="{E69DC58F-3459-BBF3-F312-11E2AA9F7888}"/>
+              </a:ext>
+            </a:extLst>
+          </p:cNvPr>
+          <p:cNvSpPr>
+            <a:spLocks noGrp="1"/>
+          </p:cNvSpPr>
+          <p:nvPr>
+            <p:ph/>
+          </p:nvPr>
+        </p:nvSpPr>
+        <p:spPr/>
+        <p:txBody>
+          <a:bodyPr/>
+          <a:lstStyle/>
+          <a:p>
+            <a:endParaRPr lang="en-US"/>
+          </a:p>
+        </p:txBody>
+      </p:sp>
+      <p:sp>
+        <p:nvSpPr>
+          <p:cNvPr id="3" name="Title 2">
+            <a:extLst>
+              <a:ext uri="{FF2B5EF4-FFF2-40B4-BE49-F238E27FC236}">
+                <a16:creationId xmlns:a16="http://schemas.microsoft.com/office/drawing/2014/main" id="{17C6241A-D242-92A5-3F01-F8E1025DAAD1}"/>
+              </a:ext>
+            </a:extLst>
+          </p:cNvPr>
+          <p:cNvSpPr>
+            <a:spLocks noGrp="1"/>
+          </p:cNvSpPr>
+          <p:nvPr>
+            <p:ph type="title"/>
+          </p:nvPr>
+        </p:nvSpPr>
+        <p:spPr/>
+        <p:txBody>
+          <a:bodyPr/>
+          <a:lstStyle/>
+          <a:p>
+            <a:endParaRPr lang="en-US"/>
+          </a:p>
+        </p:txBody>
+      </p:sp>
+    </p:spTree>
+    <p:extLst>
+      <p:ext uri="{BB962C8B-B14F-4D97-AF65-F5344CB8AC3E}">
+        <p14:creationId xmlns:p14="http://schemas.microsoft.com/office/powerpoint/2010/main" val="2629199843"/>
+      </p:ext>
+    </p:extLst>
+  </p:cSld>
+  <p:clrMapOvr>
+    <a:masterClrMapping/>
+  </p:clrMapOvr>
+</p:sld>
+</file>
+
+<file path=ppt/slides/slide4.xml><?xml version="1.0" encoding="utf-8"?>
 <p:sld xmlns:a="http://schemas.openxmlformats.org/drawingml/2006/main" xmlns:r="http://schemas.openxmlformats.org/officeDocument/2006/relationships" xmlns:p="http://schemas.openxmlformats.org/presentationml/2006/main">
   <p:cSld>
     <p:spTree>

</xml_diff>